<commit_message>
P5_Clustering : fixé trois sélections de variables et transformation UMAP, calculé les datasets pour les périodes de temps | Other_clusterers_draft.ipynb : testé gaussian mixture et Agglomerative clustering, prêt à être intégré | Fait fonctionner agglomerative clustering avec inductive clustering (classe spéciale) | modifié prepare_2D_axes et plot_projection pour pouvoir fonctionner avec différents clusterers | fait touner le notebook avec la première sélection (13 variables : sel A)
</commit_message>
<xml_diff>
--- a/PRESENTATION/Projet5.pptx
+++ b/PRESENTATION/Projet5.pptx
@@ -5,18 +5,20 @@
     <p:sldMasterId id="2147483648" r:id="rId1"/>
   </p:sldMasterIdLst>
   <p:notesMasterIdLst>
-    <p:notesMasterId r:id="rId8"/>
+    <p:notesMasterId r:id="rId10"/>
   </p:notesMasterIdLst>
   <p:handoutMasterIdLst>
-    <p:handoutMasterId r:id="rId9"/>
+    <p:handoutMasterId r:id="rId11"/>
   </p:handoutMasterIdLst>
   <p:sldIdLst>
     <p:sldId id="278" r:id="rId2"/>
     <p:sldId id="339" r:id="rId3"/>
     <p:sldId id="258" r:id="rId4"/>
     <p:sldId id="342" r:id="rId5"/>
-    <p:sldId id="285" r:id="rId6"/>
-    <p:sldId id="359" r:id="rId7"/>
+    <p:sldId id="360" r:id="rId6"/>
+    <p:sldId id="361" r:id="rId7"/>
+    <p:sldId id="285" r:id="rId8"/>
+    <p:sldId id="359" r:id="rId9"/>
   </p:sldIdLst>
   <p:sldSz cx="9144000" cy="6858000" type="screen4x3"/>
   <p:notesSz cx="6858000" cy="9144000"/>
@@ -200,7 +202,7 @@
           <a:p>
             <a:fld id="{57ED8D38-08F1-4F61-B916-B7ECFC3A7ADF}" type="datetimeFigureOut">
               <a:rPr lang="fr-FR" smtClean="0"/>
-              <a:t>07/09/2020</a:t>
+              <a:t>18/09/2020</a:t>
             </a:fld>
             <a:endParaRPr lang="fr-FR"/>
           </a:p>
@@ -365,7 +367,7 @@
           <a:p>
             <a:fld id="{DB91E950-E7C0-4AB1-98FE-263150A09AFE}" type="datetimeFigureOut">
               <a:rPr lang="fr-FR" smtClean="0"/>
-              <a:t>07/09/2020</a:t>
+              <a:t>18/09/2020</a:t>
             </a:fld>
             <a:endParaRPr lang="fr-FR"/>
           </a:p>
@@ -3822,15 +3824,7 @@
                 <a:ea typeface="Yu Gothic" panose="020B0400000000000000" pitchFamily="34" charset="-128"/>
                 <a:cs typeface="Arimo" panose="020B0604020202020204" pitchFamily="34" charset="0"/>
               </a:rPr>
-              <a:t>Projet </a:t>
-            </a:r>
-            <a:r>
-              <a:rPr lang="fr-FR" sz="3600" smtClean="0">
-                <a:latin typeface="Yu Gothic" panose="020B0400000000000000" pitchFamily="34" charset="-128"/>
-                <a:ea typeface="Yu Gothic" panose="020B0400000000000000" pitchFamily="34" charset="-128"/>
-                <a:cs typeface="Arimo" panose="020B0604020202020204" pitchFamily="34" charset="0"/>
-              </a:rPr>
-              <a:t>5</a:t>
+              <a:t>Projet 5</a:t>
             </a:r>
             <a:endParaRPr lang="fr-FR" sz="3600">
               <a:latin typeface="Yu Gothic" panose="020B0400000000000000" pitchFamily="34" charset="-128"/>
@@ -4144,38 +4138,8 @@
                 <a:ea typeface="Yu Gothic UI Semilight" panose="020B0400000000000000" pitchFamily="34" charset="-128"/>
                 <a:cs typeface="Segoe UI" panose="020B0502040204020203" pitchFamily="34" charset="0"/>
               </a:rPr>
-              <a:t>Scientist  |  </a:t>
-            </a:r>
-            <a:r>
-              <a:rPr lang="fr-FR" sz="2400" smtClean="0">
-                <a:solidFill>
-                  <a:schemeClr val="tx1"/>
-                </a:solidFill>
-                <a:latin typeface="Yu Gothic UI Semilight" panose="020B0400000000000000" pitchFamily="34" charset="-128"/>
-                <a:ea typeface="Yu Gothic UI Semilight" panose="020B0400000000000000" pitchFamily="34" charset="-128"/>
-                <a:cs typeface="Segoe UI" panose="020B0502040204020203" pitchFamily="34" charset="0"/>
-              </a:rPr>
-              <a:t>__</a:t>
-            </a:r>
-            <a:r>
-              <a:rPr lang="fr-FR" sz="2400" smtClean="0">
-                <a:solidFill>
-                  <a:schemeClr val="tx1"/>
-                </a:solidFill>
-                <a:latin typeface="Yu Gothic UI Semilight" panose="020B0400000000000000" pitchFamily="34" charset="-128"/>
-                <a:ea typeface="Yu Gothic UI Semilight" panose="020B0400000000000000" pitchFamily="34" charset="-128"/>
-                <a:cs typeface="Segoe UI" panose="020B0502040204020203" pitchFamily="34" charset="0"/>
-              </a:rPr>
-              <a:t>/09/20  </a:t>
-            </a:r>
-            <a:endParaRPr lang="fr-FR" sz="2400" smtClean="0">
-              <a:solidFill>
-                <a:schemeClr val="tx1"/>
-              </a:solidFill>
-              <a:latin typeface="Yu Gothic UI Semilight" panose="020B0400000000000000" pitchFamily="34" charset="-128"/>
-              <a:ea typeface="Yu Gothic UI Semilight" panose="020B0400000000000000" pitchFamily="34" charset="-128"/>
-              <a:cs typeface="Segoe UI" panose="020B0502040204020203" pitchFamily="34" charset="0"/>
-            </a:endParaRPr>
+              <a:t>Scientist  |  __/09/20  </a:t>
+            </a:r>
           </a:p>
           <a:p>
             <a:endParaRPr lang="fr-FR" sz="2400">
@@ -4947,7 +4911,7 @@
       </p:sp>
       <p:grpSp>
         <p:nvGrpSpPr>
-          <p:cNvPr id="12" name="Groupe 11"/>
+          <p:cNvPr id="16" name="Groupe 15"/>
           <p:cNvGrpSpPr/>
           <p:nvPr/>
         </p:nvGrpSpPr>
@@ -4961,7 +4925,7 @@
         </p:grpSpPr>
         <p:sp>
           <p:nvSpPr>
-            <p:cNvPr id="13" name="Rectangle 12"/>
+            <p:cNvPr id="18" name="Rectangle 17"/>
             <p:cNvSpPr/>
             <p:nvPr/>
           </p:nvSpPr>
@@ -4974,9 +4938,7 @@
               <a:avLst/>
             </a:prstGeom>
             <a:solidFill>
-              <a:schemeClr val="accent1">
-                <a:lumMod val="75000"/>
-              </a:schemeClr>
+              <a:srgbClr val="00CCFF"/>
             </a:solidFill>
             <a:ln w="6350">
               <a:solidFill>
@@ -5007,16 +4969,13 @@
             <a:lstStyle/>
             <a:p>
               <a:pPr algn="ctr"/>
-              <a:endParaRPr lang="fr-FR">
-                <a:latin typeface="Yu Gothic UI Light" panose="020B0300000000000000" pitchFamily="34" charset="-128"/>
-                <a:ea typeface="Yu Gothic UI Light" panose="020B0300000000000000" pitchFamily="34" charset="-128"/>
-              </a:endParaRPr>
+              <a:endParaRPr lang="fr-FR"/>
             </a:p>
           </p:txBody>
         </p:sp>
         <p:sp>
           <p:nvSpPr>
-            <p:cNvPr id="14" name="Rectangle 13"/>
+            <p:cNvPr id="19" name="Rectangle 18"/>
             <p:cNvSpPr/>
             <p:nvPr/>
           </p:nvSpPr>
@@ -5062,16 +5021,13 @@
             <a:lstStyle/>
             <a:p>
               <a:pPr algn="ctr"/>
-              <a:endParaRPr lang="fr-FR">
-                <a:latin typeface="Yu Gothic UI Light" panose="020B0300000000000000" pitchFamily="34" charset="-128"/>
-                <a:ea typeface="Yu Gothic UI Light" panose="020B0300000000000000" pitchFamily="34" charset="-128"/>
-              </a:endParaRPr>
+              <a:endParaRPr lang="fr-FR"/>
             </a:p>
           </p:txBody>
         </p:sp>
         <p:sp>
           <p:nvSpPr>
-            <p:cNvPr id="15" name="Rectangle 14"/>
+            <p:cNvPr id="20" name="Rectangle 19"/>
             <p:cNvSpPr/>
             <p:nvPr/>
           </p:nvSpPr>
@@ -5117,16 +5073,13 @@
             <a:lstStyle/>
             <a:p>
               <a:pPr algn="ctr"/>
-              <a:endParaRPr lang="fr-FR">
-                <a:latin typeface="Yu Gothic UI Light" panose="020B0300000000000000" pitchFamily="34" charset="-128"/>
-                <a:ea typeface="Yu Gothic UI Light" panose="020B0300000000000000" pitchFamily="34" charset="-128"/>
-              </a:endParaRPr>
+              <a:endParaRPr lang="fr-FR"/>
             </a:p>
           </p:txBody>
         </p:sp>
         <p:sp>
           <p:nvSpPr>
-            <p:cNvPr id="17" name="Rectangle 16"/>
+            <p:cNvPr id="21" name="Rectangle 20"/>
             <p:cNvSpPr/>
             <p:nvPr/>
           </p:nvSpPr>
@@ -5172,10 +5125,7 @@
             <a:lstStyle/>
             <a:p>
               <a:pPr algn="ctr"/>
-              <a:endParaRPr lang="fr-FR">
-                <a:latin typeface="Yu Gothic UI Light" panose="020B0300000000000000" pitchFamily="34" charset="-128"/>
-                <a:ea typeface="Yu Gothic UI Light" panose="020B0300000000000000" pitchFamily="34" charset="-128"/>
-              </a:endParaRPr>
+              <a:endParaRPr lang="fr-FR"/>
             </a:p>
           </p:txBody>
         </p:sp>
@@ -5743,7 +5693,7 @@
             </a:pPr>
             <a:r>
               <a:rPr lang="fr-FR" sz="2800" smtClean="0">
-                <a:latin typeface="Yu Gothic UI Light" panose="020B0300000000000000" pitchFamily="34" charset="-128"/>
+                <a:latin typeface="+mj-lt"/>
                 <a:ea typeface="Yu Gothic UI Light" panose="020B0300000000000000" pitchFamily="34" charset="-128"/>
                 <a:cs typeface="Segoe UI" panose="020B0502040204020203" pitchFamily="34" charset="0"/>
               </a:rPr>
@@ -5769,7 +5719,7 @@
             </a:pPr>
             <a:r>
               <a:rPr lang="fr-FR" sz="2800" smtClean="0">
-                <a:latin typeface="+mj-lt"/>
+                <a:latin typeface="Yu Gothic UI Light" panose="020B0300000000000000" pitchFamily="34" charset="-128"/>
                 <a:ea typeface="Yu Gothic UI Light" panose="020B0300000000000000" pitchFamily="34" charset="-128"/>
                 <a:cs typeface="Segoe UI" panose="020B0502040204020203" pitchFamily="34" charset="0"/>
               </a:rPr>
@@ -5787,36 +5737,269 @@
       </p:sp>
       <p:grpSp>
         <p:nvGrpSpPr>
-          <p:cNvPr id="12" name="Groupe 11"/>
+          <p:cNvPr id="2" name="Groupe 1"/>
           <p:cNvGrpSpPr/>
           <p:nvPr/>
         </p:nvGrpSpPr>
         <p:grpSpPr>
           <a:xfrm>
             <a:off x="8288350" y="3135701"/>
-            <a:ext cx="244090" cy="2085523"/>
-            <a:chOff x="8648390" y="4292733"/>
-            <a:chExt cx="144016" cy="864096"/>
+            <a:ext cx="244091" cy="2085523"/>
+            <a:chOff x="8288350" y="3135701"/>
+            <a:chExt cx="244091" cy="2085523"/>
           </a:xfrm>
         </p:grpSpPr>
+        <p:grpSp>
+          <p:nvGrpSpPr>
+            <p:cNvPr id="12" name="Groupe 11"/>
+            <p:cNvGrpSpPr/>
+            <p:nvPr/>
+          </p:nvGrpSpPr>
+          <p:grpSpPr>
+            <a:xfrm>
+              <a:off x="8288350" y="3135701"/>
+              <a:ext cx="244090" cy="2085523"/>
+              <a:chOff x="8648390" y="4292733"/>
+              <a:chExt cx="144016" cy="864096"/>
+            </a:xfrm>
+          </p:grpSpPr>
+          <p:sp>
+            <p:nvSpPr>
+              <p:cNvPr id="13" name="Rectangle 12"/>
+              <p:cNvSpPr/>
+              <p:nvPr/>
+            </p:nvSpPr>
+            <p:spPr>
+              <a:xfrm>
+                <a:off x="8648390" y="4292733"/>
+                <a:ext cx="144016" cy="216024"/>
+              </a:xfrm>
+              <a:prstGeom prst="rect">
+                <a:avLst/>
+              </a:prstGeom>
+              <a:solidFill>
+                <a:schemeClr val="bg1">
+                  <a:lumMod val="50000"/>
+                </a:schemeClr>
+              </a:solidFill>
+              <a:ln w="6350">
+                <a:solidFill>
+                  <a:schemeClr val="bg1">
+                    <a:lumMod val="65000"/>
+                  </a:schemeClr>
+                </a:solidFill>
+              </a:ln>
+            </p:spPr>
+            <p:style>
+              <a:lnRef idx="2">
+                <a:schemeClr val="accent1">
+                  <a:shade val="50000"/>
+                </a:schemeClr>
+              </a:lnRef>
+              <a:fillRef idx="1">
+                <a:schemeClr val="accent1"/>
+              </a:fillRef>
+              <a:effectRef idx="0">
+                <a:schemeClr val="accent1"/>
+              </a:effectRef>
+              <a:fontRef idx="minor">
+                <a:schemeClr val="lt1"/>
+              </a:fontRef>
+            </p:style>
+            <p:txBody>
+              <a:bodyPr rtlCol="0" anchor="ctr"/>
+              <a:lstStyle/>
+              <a:p>
+                <a:pPr algn="ctr"/>
+                <a:endParaRPr lang="fr-FR">
+                  <a:latin typeface="Yu Gothic UI Light" panose="020B0300000000000000" pitchFamily="34" charset="-128"/>
+                  <a:ea typeface="Yu Gothic UI Light" panose="020B0300000000000000" pitchFamily="34" charset="-128"/>
+                </a:endParaRPr>
+              </a:p>
+            </p:txBody>
+          </p:sp>
+          <p:sp>
+            <p:nvSpPr>
+              <p:cNvPr id="14" name="Rectangle 13"/>
+              <p:cNvSpPr/>
+              <p:nvPr/>
+            </p:nvSpPr>
+            <p:spPr>
+              <a:xfrm>
+                <a:off x="8648390" y="4508757"/>
+                <a:ext cx="144016" cy="216024"/>
+              </a:xfrm>
+              <a:prstGeom prst="rect">
+                <a:avLst/>
+              </a:prstGeom>
+              <a:solidFill>
+                <a:schemeClr val="bg1">
+                  <a:lumMod val="50000"/>
+                </a:schemeClr>
+              </a:solidFill>
+              <a:ln w="6350">
+                <a:solidFill>
+                  <a:schemeClr val="bg1">
+                    <a:lumMod val="65000"/>
+                  </a:schemeClr>
+                </a:solidFill>
+              </a:ln>
+            </p:spPr>
+            <p:style>
+              <a:lnRef idx="2">
+                <a:schemeClr val="accent1">
+                  <a:shade val="50000"/>
+                </a:schemeClr>
+              </a:lnRef>
+              <a:fillRef idx="1">
+                <a:schemeClr val="accent1"/>
+              </a:fillRef>
+              <a:effectRef idx="0">
+                <a:schemeClr val="accent1"/>
+              </a:effectRef>
+              <a:fontRef idx="minor">
+                <a:schemeClr val="lt1"/>
+              </a:fontRef>
+            </p:style>
+            <p:txBody>
+              <a:bodyPr rtlCol="0" anchor="ctr"/>
+              <a:lstStyle/>
+              <a:p>
+                <a:pPr algn="ctr"/>
+                <a:endParaRPr lang="fr-FR">
+                  <a:latin typeface="Yu Gothic UI Light" panose="020B0300000000000000" pitchFamily="34" charset="-128"/>
+                  <a:ea typeface="Yu Gothic UI Light" panose="020B0300000000000000" pitchFamily="34" charset="-128"/>
+                </a:endParaRPr>
+              </a:p>
+            </p:txBody>
+          </p:sp>
+          <p:sp>
+            <p:nvSpPr>
+              <p:cNvPr id="15" name="Rectangle 14"/>
+              <p:cNvSpPr/>
+              <p:nvPr/>
+            </p:nvSpPr>
+            <p:spPr>
+              <a:xfrm>
+                <a:off x="8648390" y="4724781"/>
+                <a:ext cx="144016" cy="216024"/>
+              </a:xfrm>
+              <a:prstGeom prst="rect">
+                <a:avLst/>
+              </a:prstGeom>
+              <a:solidFill>
+                <a:schemeClr val="bg1">
+                  <a:lumMod val="50000"/>
+                </a:schemeClr>
+              </a:solidFill>
+              <a:ln w="6350">
+                <a:solidFill>
+                  <a:schemeClr val="bg1">
+                    <a:lumMod val="65000"/>
+                  </a:schemeClr>
+                </a:solidFill>
+              </a:ln>
+            </p:spPr>
+            <p:style>
+              <a:lnRef idx="2">
+                <a:schemeClr val="accent1">
+                  <a:shade val="50000"/>
+                </a:schemeClr>
+              </a:lnRef>
+              <a:fillRef idx="1">
+                <a:schemeClr val="accent1"/>
+              </a:fillRef>
+              <a:effectRef idx="0">
+                <a:schemeClr val="accent1"/>
+              </a:effectRef>
+              <a:fontRef idx="minor">
+                <a:schemeClr val="lt1"/>
+              </a:fontRef>
+            </p:style>
+            <p:txBody>
+              <a:bodyPr rtlCol="0" anchor="ctr"/>
+              <a:lstStyle/>
+              <a:p>
+                <a:pPr algn="ctr"/>
+                <a:endParaRPr lang="fr-FR">
+                  <a:latin typeface="Yu Gothic UI Light" panose="020B0300000000000000" pitchFamily="34" charset="-128"/>
+                  <a:ea typeface="Yu Gothic UI Light" panose="020B0300000000000000" pitchFamily="34" charset="-128"/>
+                </a:endParaRPr>
+              </a:p>
+            </p:txBody>
+          </p:sp>
+          <p:sp>
+            <p:nvSpPr>
+              <p:cNvPr id="17" name="Rectangle 16"/>
+              <p:cNvSpPr/>
+              <p:nvPr/>
+            </p:nvSpPr>
+            <p:spPr>
+              <a:xfrm>
+                <a:off x="8648390" y="4940805"/>
+                <a:ext cx="144016" cy="216024"/>
+              </a:xfrm>
+              <a:prstGeom prst="rect">
+                <a:avLst/>
+              </a:prstGeom>
+              <a:solidFill>
+                <a:schemeClr val="bg1">
+                  <a:lumMod val="50000"/>
+                </a:schemeClr>
+              </a:solidFill>
+              <a:ln w="6350">
+                <a:solidFill>
+                  <a:schemeClr val="bg1">
+                    <a:lumMod val="65000"/>
+                  </a:schemeClr>
+                </a:solidFill>
+              </a:ln>
+            </p:spPr>
+            <p:style>
+              <a:lnRef idx="2">
+                <a:schemeClr val="accent1">
+                  <a:shade val="50000"/>
+                </a:schemeClr>
+              </a:lnRef>
+              <a:fillRef idx="1">
+                <a:schemeClr val="accent1"/>
+              </a:fillRef>
+              <a:effectRef idx="0">
+                <a:schemeClr val="accent1"/>
+              </a:effectRef>
+              <a:fontRef idx="minor">
+                <a:schemeClr val="lt1"/>
+              </a:fontRef>
+            </p:style>
+            <p:txBody>
+              <a:bodyPr rtlCol="0" anchor="ctr"/>
+              <a:lstStyle/>
+              <a:p>
+                <a:pPr algn="ctr"/>
+                <a:endParaRPr lang="fr-FR">
+                  <a:latin typeface="Yu Gothic UI Light" panose="020B0300000000000000" pitchFamily="34" charset="-128"/>
+                  <a:ea typeface="Yu Gothic UI Light" panose="020B0300000000000000" pitchFamily="34" charset="-128"/>
+                </a:endParaRPr>
+              </a:p>
+            </p:txBody>
+          </p:sp>
+        </p:grpSp>
         <p:sp>
           <p:nvSpPr>
-            <p:cNvPr id="13" name="Rectangle 12"/>
+            <p:cNvPr id="19" name="Rectangle 18"/>
             <p:cNvSpPr/>
             <p:nvPr/>
           </p:nvSpPr>
           <p:spPr>
             <a:xfrm>
-              <a:off x="8648390" y="4292733"/>
-              <a:ext cx="144016" cy="216024"/>
+              <a:off x="8288351" y="3657087"/>
+              <a:ext cx="244090" cy="521381"/>
             </a:xfrm>
             <a:prstGeom prst="rect">
               <a:avLst/>
             </a:prstGeom>
             <a:solidFill>
-              <a:schemeClr val="bg1">
-                <a:lumMod val="50000"/>
-              </a:schemeClr>
+              <a:srgbClr val="00153E"/>
             </a:solidFill>
             <a:ln w="6350">
               <a:solidFill>
@@ -5847,175 +6030,7 @@
             <a:lstStyle/>
             <a:p>
               <a:pPr algn="ctr"/>
-              <a:endParaRPr lang="fr-FR">
-                <a:latin typeface="Yu Gothic UI Light" panose="020B0300000000000000" pitchFamily="34" charset="-128"/>
-                <a:ea typeface="Yu Gothic UI Light" panose="020B0300000000000000" pitchFamily="34" charset="-128"/>
-              </a:endParaRPr>
-            </a:p>
-          </p:txBody>
-        </p:sp>
-        <p:sp>
-          <p:nvSpPr>
-            <p:cNvPr id="14" name="Rectangle 13"/>
-            <p:cNvSpPr/>
-            <p:nvPr/>
-          </p:nvSpPr>
-          <p:spPr>
-            <a:xfrm>
-              <a:off x="8648390" y="4508757"/>
-              <a:ext cx="144016" cy="216024"/>
-            </a:xfrm>
-            <a:prstGeom prst="rect">
-              <a:avLst/>
-            </a:prstGeom>
-            <a:solidFill>
-              <a:schemeClr val="bg1">
-                <a:lumMod val="50000"/>
-              </a:schemeClr>
-            </a:solidFill>
-            <a:ln w="6350">
-              <a:solidFill>
-                <a:schemeClr val="bg1">
-                  <a:lumMod val="65000"/>
-                </a:schemeClr>
-              </a:solidFill>
-            </a:ln>
-          </p:spPr>
-          <p:style>
-            <a:lnRef idx="2">
-              <a:schemeClr val="accent1">
-                <a:shade val="50000"/>
-              </a:schemeClr>
-            </a:lnRef>
-            <a:fillRef idx="1">
-              <a:schemeClr val="accent1"/>
-            </a:fillRef>
-            <a:effectRef idx="0">
-              <a:schemeClr val="accent1"/>
-            </a:effectRef>
-            <a:fontRef idx="minor">
-              <a:schemeClr val="lt1"/>
-            </a:fontRef>
-          </p:style>
-          <p:txBody>
-            <a:bodyPr rtlCol="0" anchor="ctr"/>
-            <a:lstStyle/>
-            <a:p>
-              <a:pPr algn="ctr"/>
-              <a:endParaRPr lang="fr-FR">
-                <a:latin typeface="Yu Gothic UI Light" panose="020B0300000000000000" pitchFamily="34" charset="-128"/>
-                <a:ea typeface="Yu Gothic UI Light" panose="020B0300000000000000" pitchFamily="34" charset="-128"/>
-              </a:endParaRPr>
-            </a:p>
-          </p:txBody>
-        </p:sp>
-        <p:sp>
-          <p:nvSpPr>
-            <p:cNvPr id="15" name="Rectangle 14"/>
-            <p:cNvSpPr/>
-            <p:nvPr/>
-          </p:nvSpPr>
-          <p:spPr>
-            <a:xfrm>
-              <a:off x="8648390" y="4724781"/>
-              <a:ext cx="144016" cy="216024"/>
-            </a:xfrm>
-            <a:prstGeom prst="rect">
-              <a:avLst/>
-            </a:prstGeom>
-            <a:solidFill>
-              <a:schemeClr val="bg1">
-                <a:lumMod val="50000"/>
-              </a:schemeClr>
-            </a:solidFill>
-            <a:ln w="6350">
-              <a:solidFill>
-                <a:schemeClr val="bg1">
-                  <a:lumMod val="65000"/>
-                </a:schemeClr>
-              </a:solidFill>
-            </a:ln>
-          </p:spPr>
-          <p:style>
-            <a:lnRef idx="2">
-              <a:schemeClr val="accent1">
-                <a:shade val="50000"/>
-              </a:schemeClr>
-            </a:lnRef>
-            <a:fillRef idx="1">
-              <a:schemeClr val="accent1"/>
-            </a:fillRef>
-            <a:effectRef idx="0">
-              <a:schemeClr val="accent1"/>
-            </a:effectRef>
-            <a:fontRef idx="minor">
-              <a:schemeClr val="lt1"/>
-            </a:fontRef>
-          </p:style>
-          <p:txBody>
-            <a:bodyPr rtlCol="0" anchor="ctr"/>
-            <a:lstStyle/>
-            <a:p>
-              <a:pPr algn="ctr"/>
-              <a:endParaRPr lang="fr-FR">
-                <a:latin typeface="Yu Gothic UI Light" panose="020B0300000000000000" pitchFamily="34" charset="-128"/>
-                <a:ea typeface="Yu Gothic UI Light" panose="020B0300000000000000" pitchFamily="34" charset="-128"/>
-              </a:endParaRPr>
-            </a:p>
-          </p:txBody>
-        </p:sp>
-        <p:sp>
-          <p:nvSpPr>
-            <p:cNvPr id="17" name="Rectangle 16"/>
-            <p:cNvSpPr/>
-            <p:nvPr/>
-          </p:nvSpPr>
-          <p:spPr>
-            <a:xfrm>
-              <a:off x="8648390" y="4940805"/>
-              <a:ext cx="144016" cy="216024"/>
-            </a:xfrm>
-            <a:prstGeom prst="rect">
-              <a:avLst/>
-            </a:prstGeom>
-            <a:solidFill>
-              <a:schemeClr val="accent4">
-                <a:lumMod val="75000"/>
-              </a:schemeClr>
-            </a:solidFill>
-            <a:ln w="6350">
-              <a:solidFill>
-                <a:schemeClr val="bg1">
-                  <a:lumMod val="65000"/>
-                </a:schemeClr>
-              </a:solidFill>
-            </a:ln>
-          </p:spPr>
-          <p:style>
-            <a:lnRef idx="2">
-              <a:schemeClr val="accent1">
-                <a:shade val="50000"/>
-              </a:schemeClr>
-            </a:lnRef>
-            <a:fillRef idx="1">
-              <a:schemeClr val="accent1"/>
-            </a:fillRef>
-            <a:effectRef idx="0">
-              <a:schemeClr val="accent1"/>
-            </a:effectRef>
-            <a:fontRef idx="minor">
-              <a:schemeClr val="lt1"/>
-            </a:fontRef>
-          </p:style>
-          <p:txBody>
-            <a:bodyPr rtlCol="0" anchor="ctr"/>
-            <a:lstStyle/>
-            <a:p>
-              <a:pPr algn="ctr"/>
-              <a:endParaRPr lang="fr-FR">
-                <a:latin typeface="Yu Gothic UI Light" panose="020B0300000000000000" pitchFamily="34" charset="-128"/>
-                <a:ea typeface="Yu Gothic UI Light" panose="020B0300000000000000" pitchFamily="34" charset="-128"/>
-              </a:endParaRPr>
+              <a:endParaRPr lang="fr-FR"/>
             </a:p>
           </p:txBody>
         </p:sp>
@@ -6059,6 +6074,1256 @@
       </p:grpSpPr>
       <p:sp>
         <p:nvSpPr>
+          <p:cNvPr id="4" name="Espace réservé de la date 3"/>
+          <p:cNvSpPr>
+            <a:spLocks noGrp="1"/>
+          </p:cNvSpPr>
+          <p:nvPr>
+            <p:ph type="dt" sz="half" idx="10"/>
+          </p:nvPr>
+        </p:nvSpPr>
+        <p:spPr/>
+        <p:txBody>
+          <a:bodyPr/>
+          <a:lstStyle/>
+          <a:p>
+            <a:r>
+              <a:rPr lang="fr-FR" smtClean="0"/>
+              <a:t>17/06/2020</a:t>
+            </a:r>
+            <a:endParaRPr lang="fr-FR"/>
+          </a:p>
+        </p:txBody>
+      </p:sp>
+      <p:sp>
+        <p:nvSpPr>
+          <p:cNvPr id="5" name="Espace réservé du pied de page 4"/>
+          <p:cNvSpPr>
+            <a:spLocks noGrp="1"/>
+          </p:cNvSpPr>
+          <p:nvPr>
+            <p:ph type="ftr" sz="quarter" idx="11"/>
+          </p:nvPr>
+        </p:nvSpPr>
+        <p:spPr/>
+        <p:txBody>
+          <a:bodyPr/>
+          <a:lstStyle/>
+          <a:p>
+            <a:r>
+              <a:rPr lang="fr-FR" smtClean="0"/>
+              <a:t>Maryse Muller | Parcours Data Scientist</a:t>
+            </a:r>
+            <a:endParaRPr lang="fr-FR"/>
+          </a:p>
+        </p:txBody>
+      </p:sp>
+      <p:sp>
+        <p:nvSpPr>
+          <p:cNvPr id="6" name="Espace réservé du numéro de diapositive 5"/>
+          <p:cNvSpPr>
+            <a:spLocks noGrp="1"/>
+          </p:cNvSpPr>
+          <p:nvPr>
+            <p:ph type="sldNum" sz="quarter" idx="12"/>
+          </p:nvPr>
+        </p:nvSpPr>
+        <p:spPr/>
+        <p:txBody>
+          <a:bodyPr/>
+          <a:lstStyle/>
+          <a:p>
+            <a:fld id="{D384C430-F8FC-4B07-B0BC-750FA1B3CF0A}" type="slidenum">
+              <a:rPr lang="fr-FR" smtClean="0"/>
+              <a:t>5</a:t>
+            </a:fld>
+            <a:endParaRPr lang="fr-FR"/>
+          </a:p>
+        </p:txBody>
+      </p:sp>
+      <p:sp>
+        <p:nvSpPr>
+          <p:cNvPr id="11" name="Sous-titre 2"/>
+          <p:cNvSpPr txBox="1">
+            <a:spLocks/>
+          </p:cNvSpPr>
+          <p:nvPr/>
+        </p:nvSpPr>
+        <p:spPr>
+          <a:xfrm>
+            <a:off x="3720783" y="3160318"/>
+            <a:ext cx="4496544" cy="2131990"/>
+          </a:xfrm>
+          <a:prstGeom prst="rect">
+            <a:avLst/>
+          </a:prstGeom>
+        </p:spPr>
+        <p:txBody>
+          <a:bodyPr>
+            <a:noAutofit/>
+          </a:bodyPr>
+          <a:lstStyle>
+            <a:lvl1pPr marL="342900" indent="-342900" algn="l" defTabSz="914400" rtl="0" eaLnBrk="1" latinLnBrk="0" hangingPunct="1">
+              <a:spcBef>
+                <a:spcPct val="20000"/>
+              </a:spcBef>
+              <a:buFont typeface="Arial" panose="020B0604020202020204" pitchFamily="34" charset="0"/>
+              <a:buChar char="•"/>
+              <a:defRPr sz="3200" kern="1200">
+                <a:solidFill>
+                  <a:schemeClr val="tx1"/>
+                </a:solidFill>
+                <a:latin typeface="+mn-lt"/>
+                <a:ea typeface="+mn-ea"/>
+                <a:cs typeface="+mn-cs"/>
+              </a:defRPr>
+            </a:lvl1pPr>
+            <a:lvl2pPr marL="742950" indent="-285750" algn="l" defTabSz="914400" rtl="0" eaLnBrk="1" latinLnBrk="0" hangingPunct="1">
+              <a:spcBef>
+                <a:spcPct val="20000"/>
+              </a:spcBef>
+              <a:buFont typeface="Arial" panose="020B0604020202020204" pitchFamily="34" charset="0"/>
+              <a:buChar char="–"/>
+              <a:defRPr sz="2800" kern="1200">
+                <a:solidFill>
+                  <a:schemeClr val="tx1"/>
+                </a:solidFill>
+                <a:latin typeface="+mn-lt"/>
+                <a:ea typeface="+mn-ea"/>
+                <a:cs typeface="+mn-cs"/>
+              </a:defRPr>
+            </a:lvl2pPr>
+            <a:lvl3pPr marL="1143000" indent="-228600" algn="l" defTabSz="914400" rtl="0" eaLnBrk="1" latinLnBrk="0" hangingPunct="1">
+              <a:spcBef>
+                <a:spcPct val="20000"/>
+              </a:spcBef>
+              <a:buFont typeface="Arial" panose="020B0604020202020204" pitchFamily="34" charset="0"/>
+              <a:buChar char="•"/>
+              <a:defRPr sz="2400" kern="1200">
+                <a:solidFill>
+                  <a:schemeClr val="tx1"/>
+                </a:solidFill>
+                <a:latin typeface="+mn-lt"/>
+                <a:ea typeface="+mn-ea"/>
+                <a:cs typeface="+mn-cs"/>
+              </a:defRPr>
+            </a:lvl3pPr>
+            <a:lvl4pPr marL="1600200" indent="-228600" algn="l" defTabSz="914400" rtl="0" eaLnBrk="1" latinLnBrk="0" hangingPunct="1">
+              <a:spcBef>
+                <a:spcPct val="20000"/>
+              </a:spcBef>
+              <a:buFont typeface="Arial" panose="020B0604020202020204" pitchFamily="34" charset="0"/>
+              <a:buChar char="–"/>
+              <a:defRPr sz="2000" kern="1200">
+                <a:solidFill>
+                  <a:schemeClr val="tx1"/>
+                </a:solidFill>
+                <a:latin typeface="+mn-lt"/>
+                <a:ea typeface="+mn-ea"/>
+                <a:cs typeface="+mn-cs"/>
+              </a:defRPr>
+            </a:lvl4pPr>
+            <a:lvl5pPr marL="2057400" indent="-228600" algn="l" defTabSz="914400" rtl="0" eaLnBrk="1" latinLnBrk="0" hangingPunct="1">
+              <a:spcBef>
+                <a:spcPct val="20000"/>
+              </a:spcBef>
+              <a:buFont typeface="Arial" panose="020B0604020202020204" pitchFamily="34" charset="0"/>
+              <a:buChar char="»"/>
+              <a:defRPr sz="2000" kern="1200">
+                <a:solidFill>
+                  <a:schemeClr val="tx1"/>
+                </a:solidFill>
+                <a:latin typeface="+mn-lt"/>
+                <a:ea typeface="+mn-ea"/>
+                <a:cs typeface="+mn-cs"/>
+              </a:defRPr>
+            </a:lvl5pPr>
+            <a:lvl6pPr marL="2514600" indent="-228600" algn="l" defTabSz="914400" rtl="0" eaLnBrk="1" latinLnBrk="0" hangingPunct="1">
+              <a:spcBef>
+                <a:spcPct val="20000"/>
+              </a:spcBef>
+              <a:buFont typeface="Arial" panose="020B0604020202020204" pitchFamily="34" charset="0"/>
+              <a:buChar char="•"/>
+              <a:defRPr sz="2000" kern="1200">
+                <a:solidFill>
+                  <a:schemeClr val="tx1"/>
+                </a:solidFill>
+                <a:latin typeface="+mn-lt"/>
+                <a:ea typeface="+mn-ea"/>
+                <a:cs typeface="+mn-cs"/>
+              </a:defRPr>
+            </a:lvl6pPr>
+            <a:lvl7pPr marL="2971800" indent="-228600" algn="l" defTabSz="914400" rtl="0" eaLnBrk="1" latinLnBrk="0" hangingPunct="1">
+              <a:spcBef>
+                <a:spcPct val="20000"/>
+              </a:spcBef>
+              <a:buFont typeface="Arial" panose="020B0604020202020204" pitchFamily="34" charset="0"/>
+              <a:buChar char="•"/>
+              <a:defRPr sz="2000" kern="1200">
+                <a:solidFill>
+                  <a:schemeClr val="tx1"/>
+                </a:solidFill>
+                <a:latin typeface="+mn-lt"/>
+                <a:ea typeface="+mn-ea"/>
+                <a:cs typeface="+mn-cs"/>
+              </a:defRPr>
+            </a:lvl7pPr>
+            <a:lvl8pPr marL="3429000" indent="-228600" algn="l" defTabSz="914400" rtl="0" eaLnBrk="1" latinLnBrk="0" hangingPunct="1">
+              <a:spcBef>
+                <a:spcPct val="20000"/>
+              </a:spcBef>
+              <a:buFont typeface="Arial" panose="020B0604020202020204" pitchFamily="34" charset="0"/>
+              <a:buChar char="•"/>
+              <a:defRPr sz="2000" kern="1200">
+                <a:solidFill>
+                  <a:schemeClr val="tx1"/>
+                </a:solidFill>
+                <a:latin typeface="+mn-lt"/>
+                <a:ea typeface="+mn-ea"/>
+                <a:cs typeface="+mn-cs"/>
+              </a:defRPr>
+            </a:lvl8pPr>
+            <a:lvl9pPr marL="3886200" indent="-228600" algn="l" defTabSz="914400" rtl="0" eaLnBrk="1" latinLnBrk="0" hangingPunct="1">
+              <a:spcBef>
+                <a:spcPct val="20000"/>
+              </a:spcBef>
+              <a:buFont typeface="Arial" panose="020B0604020202020204" pitchFamily="34" charset="0"/>
+              <a:buChar char="•"/>
+              <a:defRPr sz="2000" kern="1200">
+                <a:solidFill>
+                  <a:schemeClr val="tx1"/>
+                </a:solidFill>
+                <a:latin typeface="+mn-lt"/>
+                <a:ea typeface="+mn-ea"/>
+                <a:cs typeface="+mn-cs"/>
+              </a:defRPr>
+            </a:lvl9pPr>
+          </a:lstStyle>
+          <a:p>
+            <a:pPr marL="0" indent="0" algn="r">
+              <a:buNone/>
+            </a:pPr>
+            <a:r>
+              <a:rPr lang="fr-FR" sz="2800" smtClean="0">
+                <a:latin typeface="Yu Gothic UI Light" panose="020B0300000000000000" pitchFamily="34" charset="-128"/>
+                <a:ea typeface="Yu Gothic UI Light" panose="020B0300000000000000" pitchFamily="34" charset="-128"/>
+                <a:cs typeface="Segoe UI" panose="020B0502040204020203" pitchFamily="34" charset="0"/>
+              </a:rPr>
+              <a:t>Problématique</a:t>
+            </a:r>
+          </a:p>
+          <a:p>
+            <a:pPr marL="0" indent="0" algn="r">
+              <a:buNone/>
+            </a:pPr>
+            <a:r>
+              <a:rPr lang="fr-FR" sz="2800" smtClean="0">
+                <a:latin typeface="Yu Gothic UI Light" panose="020B0300000000000000" pitchFamily="34" charset="-128"/>
+                <a:ea typeface="Yu Gothic UI Light" panose="020B0300000000000000" pitchFamily="34" charset="-128"/>
+                <a:cs typeface="Segoe UI" panose="020B0502040204020203" pitchFamily="34" charset="0"/>
+              </a:rPr>
+              <a:t>Données</a:t>
+            </a:r>
+          </a:p>
+          <a:p>
+            <a:pPr marL="0" indent="0" algn="r">
+              <a:buNone/>
+            </a:pPr>
+            <a:r>
+              <a:rPr lang="fr-FR" sz="2800" smtClean="0">
+                <a:latin typeface="Yu Gothic UI Semibold" panose="020B0700000000000000" pitchFamily="34" charset="-128"/>
+                <a:ea typeface="Yu Gothic UI Semibold" panose="020B0700000000000000" pitchFamily="34" charset="-128"/>
+                <a:cs typeface="Segoe UI" panose="020B0502040204020203" pitchFamily="34" charset="0"/>
+              </a:rPr>
+              <a:t>Modélisation</a:t>
+            </a:r>
+          </a:p>
+          <a:p>
+            <a:pPr marL="0" indent="0" algn="r">
+              <a:buNone/>
+            </a:pPr>
+            <a:r>
+              <a:rPr lang="fr-FR" sz="2800" smtClean="0">
+                <a:latin typeface="Yu Gothic UI Light" panose="020B0300000000000000" pitchFamily="34" charset="-128"/>
+                <a:ea typeface="Yu Gothic UI Light" panose="020B0300000000000000" pitchFamily="34" charset="-128"/>
+                <a:cs typeface="Segoe UI" panose="020B0502040204020203" pitchFamily="34" charset="0"/>
+              </a:rPr>
+              <a:t>Conclusions</a:t>
+            </a:r>
+          </a:p>
+          <a:p>
+            <a:pPr algn="r"/>
+            <a:endParaRPr lang="fr-FR" sz="2800">
+              <a:latin typeface="Yu Gothic UI Light" panose="020B0300000000000000" pitchFamily="34" charset="-128"/>
+              <a:ea typeface="Yu Gothic UI Light" panose="020B0300000000000000" pitchFamily="34" charset="-128"/>
+            </a:endParaRPr>
+          </a:p>
+        </p:txBody>
+      </p:sp>
+      <p:grpSp>
+        <p:nvGrpSpPr>
+          <p:cNvPr id="3" name="Groupe 2"/>
+          <p:cNvGrpSpPr/>
+          <p:nvPr/>
+        </p:nvGrpSpPr>
+        <p:grpSpPr>
+          <a:xfrm>
+            <a:off x="8288350" y="3135701"/>
+            <a:ext cx="244091" cy="2085523"/>
+            <a:chOff x="8288350" y="3135701"/>
+            <a:chExt cx="244091" cy="2085523"/>
+          </a:xfrm>
+        </p:grpSpPr>
+        <p:grpSp>
+          <p:nvGrpSpPr>
+            <p:cNvPr id="16" name="Groupe 15"/>
+            <p:cNvGrpSpPr/>
+            <p:nvPr/>
+          </p:nvGrpSpPr>
+          <p:grpSpPr>
+            <a:xfrm>
+              <a:off x="8288350" y="3135701"/>
+              <a:ext cx="244090" cy="2085523"/>
+              <a:chOff x="8648390" y="4292733"/>
+              <a:chExt cx="144016" cy="864096"/>
+            </a:xfrm>
+          </p:grpSpPr>
+          <p:sp>
+            <p:nvSpPr>
+              <p:cNvPr id="18" name="Rectangle 17"/>
+              <p:cNvSpPr/>
+              <p:nvPr/>
+            </p:nvSpPr>
+            <p:spPr>
+              <a:xfrm>
+                <a:off x="8648390" y="4292733"/>
+                <a:ext cx="144016" cy="216024"/>
+              </a:xfrm>
+              <a:prstGeom prst="rect">
+                <a:avLst/>
+              </a:prstGeom>
+              <a:solidFill>
+                <a:schemeClr val="bg1">
+                  <a:lumMod val="50000"/>
+                </a:schemeClr>
+              </a:solidFill>
+              <a:ln w="6350">
+                <a:solidFill>
+                  <a:schemeClr val="bg1">
+                    <a:lumMod val="65000"/>
+                  </a:schemeClr>
+                </a:solidFill>
+              </a:ln>
+            </p:spPr>
+            <p:style>
+              <a:lnRef idx="2">
+                <a:schemeClr val="accent1">
+                  <a:shade val="50000"/>
+                </a:schemeClr>
+              </a:lnRef>
+              <a:fillRef idx="1">
+                <a:schemeClr val="accent1"/>
+              </a:fillRef>
+              <a:effectRef idx="0">
+                <a:schemeClr val="accent1"/>
+              </a:effectRef>
+              <a:fontRef idx="minor">
+                <a:schemeClr val="lt1"/>
+              </a:fontRef>
+            </p:style>
+            <p:txBody>
+              <a:bodyPr rtlCol="0" anchor="ctr"/>
+              <a:lstStyle/>
+              <a:p>
+                <a:pPr algn="ctr"/>
+                <a:endParaRPr lang="fr-FR">
+                  <a:latin typeface="Yu Gothic UI Light" panose="020B0300000000000000" pitchFamily="34" charset="-128"/>
+                  <a:ea typeface="Yu Gothic UI Light" panose="020B0300000000000000" pitchFamily="34" charset="-128"/>
+                </a:endParaRPr>
+              </a:p>
+            </p:txBody>
+          </p:sp>
+          <p:sp>
+            <p:nvSpPr>
+              <p:cNvPr id="20" name="Rectangle 19"/>
+              <p:cNvSpPr/>
+              <p:nvPr/>
+            </p:nvSpPr>
+            <p:spPr>
+              <a:xfrm>
+                <a:off x="8648390" y="4508757"/>
+                <a:ext cx="144016" cy="216024"/>
+              </a:xfrm>
+              <a:prstGeom prst="rect">
+                <a:avLst/>
+              </a:prstGeom>
+              <a:solidFill>
+                <a:schemeClr val="bg1">
+                  <a:lumMod val="50000"/>
+                </a:schemeClr>
+              </a:solidFill>
+              <a:ln w="6350">
+                <a:solidFill>
+                  <a:schemeClr val="bg1">
+                    <a:lumMod val="65000"/>
+                  </a:schemeClr>
+                </a:solidFill>
+              </a:ln>
+            </p:spPr>
+            <p:style>
+              <a:lnRef idx="2">
+                <a:schemeClr val="accent1">
+                  <a:shade val="50000"/>
+                </a:schemeClr>
+              </a:lnRef>
+              <a:fillRef idx="1">
+                <a:schemeClr val="accent1"/>
+              </a:fillRef>
+              <a:effectRef idx="0">
+                <a:schemeClr val="accent1"/>
+              </a:effectRef>
+              <a:fontRef idx="minor">
+                <a:schemeClr val="lt1"/>
+              </a:fontRef>
+            </p:style>
+            <p:txBody>
+              <a:bodyPr rtlCol="0" anchor="ctr"/>
+              <a:lstStyle/>
+              <a:p>
+                <a:pPr algn="ctr"/>
+                <a:endParaRPr lang="fr-FR">
+                  <a:latin typeface="Yu Gothic UI Light" panose="020B0300000000000000" pitchFamily="34" charset="-128"/>
+                  <a:ea typeface="Yu Gothic UI Light" panose="020B0300000000000000" pitchFamily="34" charset="-128"/>
+                </a:endParaRPr>
+              </a:p>
+            </p:txBody>
+          </p:sp>
+          <p:sp>
+            <p:nvSpPr>
+              <p:cNvPr id="21" name="Rectangle 20"/>
+              <p:cNvSpPr/>
+              <p:nvPr/>
+            </p:nvSpPr>
+            <p:spPr>
+              <a:xfrm>
+                <a:off x="8648390" y="4724781"/>
+                <a:ext cx="144016" cy="216024"/>
+              </a:xfrm>
+              <a:prstGeom prst="rect">
+                <a:avLst/>
+              </a:prstGeom>
+              <a:solidFill>
+                <a:schemeClr val="bg1">
+                  <a:lumMod val="50000"/>
+                </a:schemeClr>
+              </a:solidFill>
+              <a:ln w="6350">
+                <a:solidFill>
+                  <a:schemeClr val="bg1">
+                    <a:lumMod val="65000"/>
+                  </a:schemeClr>
+                </a:solidFill>
+              </a:ln>
+            </p:spPr>
+            <p:style>
+              <a:lnRef idx="2">
+                <a:schemeClr val="accent1">
+                  <a:shade val="50000"/>
+                </a:schemeClr>
+              </a:lnRef>
+              <a:fillRef idx="1">
+                <a:schemeClr val="accent1"/>
+              </a:fillRef>
+              <a:effectRef idx="0">
+                <a:schemeClr val="accent1"/>
+              </a:effectRef>
+              <a:fontRef idx="minor">
+                <a:schemeClr val="lt1"/>
+              </a:fontRef>
+            </p:style>
+            <p:txBody>
+              <a:bodyPr rtlCol="0" anchor="ctr"/>
+              <a:lstStyle/>
+              <a:p>
+                <a:pPr algn="ctr"/>
+                <a:endParaRPr lang="fr-FR">
+                  <a:latin typeface="Yu Gothic UI Light" panose="020B0300000000000000" pitchFamily="34" charset="-128"/>
+                  <a:ea typeface="Yu Gothic UI Light" panose="020B0300000000000000" pitchFamily="34" charset="-128"/>
+                </a:endParaRPr>
+              </a:p>
+            </p:txBody>
+          </p:sp>
+          <p:sp>
+            <p:nvSpPr>
+              <p:cNvPr id="22" name="Rectangle 21"/>
+              <p:cNvSpPr/>
+              <p:nvPr/>
+            </p:nvSpPr>
+            <p:spPr>
+              <a:xfrm>
+                <a:off x="8648390" y="4940805"/>
+                <a:ext cx="144016" cy="216024"/>
+              </a:xfrm>
+              <a:prstGeom prst="rect">
+                <a:avLst/>
+              </a:prstGeom>
+              <a:solidFill>
+                <a:schemeClr val="bg1">
+                  <a:lumMod val="50000"/>
+                </a:schemeClr>
+              </a:solidFill>
+              <a:ln w="6350">
+                <a:solidFill>
+                  <a:schemeClr val="bg1">
+                    <a:lumMod val="65000"/>
+                  </a:schemeClr>
+                </a:solidFill>
+              </a:ln>
+            </p:spPr>
+            <p:style>
+              <a:lnRef idx="2">
+                <a:schemeClr val="accent1">
+                  <a:shade val="50000"/>
+                </a:schemeClr>
+              </a:lnRef>
+              <a:fillRef idx="1">
+                <a:schemeClr val="accent1"/>
+              </a:fillRef>
+              <a:effectRef idx="0">
+                <a:schemeClr val="accent1"/>
+              </a:effectRef>
+              <a:fontRef idx="minor">
+                <a:schemeClr val="lt1"/>
+              </a:fontRef>
+            </p:style>
+            <p:txBody>
+              <a:bodyPr rtlCol="0" anchor="ctr"/>
+              <a:lstStyle/>
+              <a:p>
+                <a:pPr algn="ctr"/>
+                <a:endParaRPr lang="fr-FR">
+                  <a:latin typeface="Yu Gothic UI Light" panose="020B0300000000000000" pitchFamily="34" charset="-128"/>
+                  <a:ea typeface="Yu Gothic UI Light" panose="020B0300000000000000" pitchFamily="34" charset="-128"/>
+                </a:endParaRPr>
+              </a:p>
+            </p:txBody>
+          </p:sp>
+        </p:grpSp>
+        <p:sp>
+          <p:nvSpPr>
+            <p:cNvPr id="26" name="Rectangle 25"/>
+            <p:cNvSpPr/>
+            <p:nvPr/>
+          </p:nvSpPr>
+          <p:spPr>
+            <a:xfrm>
+              <a:off x="8288351" y="4178468"/>
+              <a:ext cx="244090" cy="521381"/>
+            </a:xfrm>
+            <a:prstGeom prst="rect">
+              <a:avLst/>
+            </a:prstGeom>
+            <a:solidFill>
+              <a:srgbClr val="00B050"/>
+            </a:solidFill>
+            <a:ln w="6350">
+              <a:solidFill>
+                <a:schemeClr val="bg1">
+                  <a:lumMod val="65000"/>
+                </a:schemeClr>
+              </a:solidFill>
+            </a:ln>
+          </p:spPr>
+          <p:style>
+            <a:lnRef idx="2">
+              <a:schemeClr val="accent1">
+                <a:shade val="50000"/>
+              </a:schemeClr>
+            </a:lnRef>
+            <a:fillRef idx="1">
+              <a:schemeClr val="accent1"/>
+            </a:fillRef>
+            <a:effectRef idx="0">
+              <a:schemeClr val="accent1"/>
+            </a:effectRef>
+            <a:fontRef idx="minor">
+              <a:schemeClr val="lt1"/>
+            </a:fontRef>
+          </p:style>
+          <p:txBody>
+            <a:bodyPr rtlCol="0" anchor="ctr"/>
+            <a:lstStyle/>
+            <a:p>
+              <a:pPr algn="ctr"/>
+              <a:endParaRPr lang="fr-FR"/>
+            </a:p>
+          </p:txBody>
+        </p:sp>
+      </p:grpSp>
+    </p:spTree>
+    <p:extLst>
+      <p:ext uri="{BB962C8B-B14F-4D97-AF65-F5344CB8AC3E}">
+        <p14:creationId xmlns:p14="http://schemas.microsoft.com/office/powerpoint/2010/main" val="3408092490"/>
+      </p:ext>
+    </p:extLst>
+  </p:cSld>
+  <p:clrMapOvr>
+    <a:masterClrMapping/>
+  </p:clrMapOvr>
+  <p:timing>
+    <p:tnLst>
+      <p:par>
+        <p:cTn id="1" dur="indefinite" restart="never" nodeType="tmRoot"/>
+      </p:par>
+    </p:tnLst>
+  </p:timing>
+</p:sld>
+</file>
+
+<file path=ppt/slides/slide6.xml><?xml version="1.0" encoding="utf-8"?>
+<p:sld xmlns:a="http://schemas.openxmlformats.org/drawingml/2006/main" xmlns:r="http://schemas.openxmlformats.org/officeDocument/2006/relationships" xmlns:p="http://schemas.openxmlformats.org/presentationml/2006/main">
+  <p:cSld>
+    <p:spTree>
+      <p:nvGrpSpPr>
+        <p:cNvPr id="1" name=""/>
+        <p:cNvGrpSpPr/>
+        <p:nvPr/>
+      </p:nvGrpSpPr>
+      <p:grpSpPr>
+        <a:xfrm>
+          <a:off x="0" y="0"/>
+          <a:ext cx="0" cy="0"/>
+          <a:chOff x="0" y="0"/>
+          <a:chExt cx="0" cy="0"/>
+        </a:xfrm>
+      </p:grpSpPr>
+      <p:sp>
+        <p:nvSpPr>
+          <p:cNvPr id="4" name="Espace réservé de la date 3"/>
+          <p:cNvSpPr>
+            <a:spLocks noGrp="1"/>
+          </p:cNvSpPr>
+          <p:nvPr>
+            <p:ph type="dt" sz="half" idx="10"/>
+          </p:nvPr>
+        </p:nvSpPr>
+        <p:spPr/>
+        <p:txBody>
+          <a:bodyPr/>
+          <a:lstStyle/>
+          <a:p>
+            <a:r>
+              <a:rPr lang="fr-FR" smtClean="0"/>
+              <a:t>17/06/2020</a:t>
+            </a:r>
+            <a:endParaRPr lang="fr-FR"/>
+          </a:p>
+        </p:txBody>
+      </p:sp>
+      <p:sp>
+        <p:nvSpPr>
+          <p:cNvPr id="5" name="Espace réservé du pied de page 4"/>
+          <p:cNvSpPr>
+            <a:spLocks noGrp="1"/>
+          </p:cNvSpPr>
+          <p:nvPr>
+            <p:ph type="ftr" sz="quarter" idx="11"/>
+          </p:nvPr>
+        </p:nvSpPr>
+        <p:spPr/>
+        <p:txBody>
+          <a:bodyPr/>
+          <a:lstStyle/>
+          <a:p>
+            <a:r>
+              <a:rPr lang="fr-FR" smtClean="0"/>
+              <a:t>Maryse Muller | Parcours Data Scientist</a:t>
+            </a:r>
+            <a:endParaRPr lang="fr-FR"/>
+          </a:p>
+        </p:txBody>
+      </p:sp>
+      <p:sp>
+        <p:nvSpPr>
+          <p:cNvPr id="6" name="Espace réservé du numéro de diapositive 5"/>
+          <p:cNvSpPr>
+            <a:spLocks noGrp="1"/>
+          </p:cNvSpPr>
+          <p:nvPr>
+            <p:ph type="sldNum" sz="quarter" idx="12"/>
+          </p:nvPr>
+        </p:nvSpPr>
+        <p:spPr/>
+        <p:txBody>
+          <a:bodyPr/>
+          <a:lstStyle/>
+          <a:p>
+            <a:fld id="{D384C430-F8FC-4B07-B0BC-750FA1B3CF0A}" type="slidenum">
+              <a:rPr lang="fr-FR" smtClean="0"/>
+              <a:t>6</a:t>
+            </a:fld>
+            <a:endParaRPr lang="fr-FR"/>
+          </a:p>
+        </p:txBody>
+      </p:sp>
+      <p:sp>
+        <p:nvSpPr>
+          <p:cNvPr id="11" name="Sous-titre 2"/>
+          <p:cNvSpPr txBox="1">
+            <a:spLocks/>
+          </p:cNvSpPr>
+          <p:nvPr/>
+        </p:nvSpPr>
+        <p:spPr>
+          <a:xfrm>
+            <a:off x="3720783" y="3160318"/>
+            <a:ext cx="4496544" cy="2131990"/>
+          </a:xfrm>
+          <a:prstGeom prst="rect">
+            <a:avLst/>
+          </a:prstGeom>
+        </p:spPr>
+        <p:txBody>
+          <a:bodyPr>
+            <a:noAutofit/>
+          </a:bodyPr>
+          <a:lstStyle>
+            <a:lvl1pPr marL="342900" indent="-342900" algn="l" defTabSz="914400" rtl="0" eaLnBrk="1" latinLnBrk="0" hangingPunct="1">
+              <a:spcBef>
+                <a:spcPct val="20000"/>
+              </a:spcBef>
+              <a:buFont typeface="Arial" panose="020B0604020202020204" pitchFamily="34" charset="0"/>
+              <a:buChar char="•"/>
+              <a:defRPr sz="3200" kern="1200">
+                <a:solidFill>
+                  <a:schemeClr val="tx1"/>
+                </a:solidFill>
+                <a:latin typeface="+mn-lt"/>
+                <a:ea typeface="+mn-ea"/>
+                <a:cs typeface="+mn-cs"/>
+              </a:defRPr>
+            </a:lvl1pPr>
+            <a:lvl2pPr marL="742950" indent="-285750" algn="l" defTabSz="914400" rtl="0" eaLnBrk="1" latinLnBrk="0" hangingPunct="1">
+              <a:spcBef>
+                <a:spcPct val="20000"/>
+              </a:spcBef>
+              <a:buFont typeface="Arial" panose="020B0604020202020204" pitchFamily="34" charset="0"/>
+              <a:buChar char="–"/>
+              <a:defRPr sz="2800" kern="1200">
+                <a:solidFill>
+                  <a:schemeClr val="tx1"/>
+                </a:solidFill>
+                <a:latin typeface="+mn-lt"/>
+                <a:ea typeface="+mn-ea"/>
+                <a:cs typeface="+mn-cs"/>
+              </a:defRPr>
+            </a:lvl2pPr>
+            <a:lvl3pPr marL="1143000" indent="-228600" algn="l" defTabSz="914400" rtl="0" eaLnBrk="1" latinLnBrk="0" hangingPunct="1">
+              <a:spcBef>
+                <a:spcPct val="20000"/>
+              </a:spcBef>
+              <a:buFont typeface="Arial" panose="020B0604020202020204" pitchFamily="34" charset="0"/>
+              <a:buChar char="•"/>
+              <a:defRPr sz="2400" kern="1200">
+                <a:solidFill>
+                  <a:schemeClr val="tx1"/>
+                </a:solidFill>
+                <a:latin typeface="+mn-lt"/>
+                <a:ea typeface="+mn-ea"/>
+                <a:cs typeface="+mn-cs"/>
+              </a:defRPr>
+            </a:lvl3pPr>
+            <a:lvl4pPr marL="1600200" indent="-228600" algn="l" defTabSz="914400" rtl="0" eaLnBrk="1" latinLnBrk="0" hangingPunct="1">
+              <a:spcBef>
+                <a:spcPct val="20000"/>
+              </a:spcBef>
+              <a:buFont typeface="Arial" panose="020B0604020202020204" pitchFamily="34" charset="0"/>
+              <a:buChar char="–"/>
+              <a:defRPr sz="2000" kern="1200">
+                <a:solidFill>
+                  <a:schemeClr val="tx1"/>
+                </a:solidFill>
+                <a:latin typeface="+mn-lt"/>
+                <a:ea typeface="+mn-ea"/>
+                <a:cs typeface="+mn-cs"/>
+              </a:defRPr>
+            </a:lvl4pPr>
+            <a:lvl5pPr marL="2057400" indent="-228600" algn="l" defTabSz="914400" rtl="0" eaLnBrk="1" latinLnBrk="0" hangingPunct="1">
+              <a:spcBef>
+                <a:spcPct val="20000"/>
+              </a:spcBef>
+              <a:buFont typeface="Arial" panose="020B0604020202020204" pitchFamily="34" charset="0"/>
+              <a:buChar char="»"/>
+              <a:defRPr sz="2000" kern="1200">
+                <a:solidFill>
+                  <a:schemeClr val="tx1"/>
+                </a:solidFill>
+                <a:latin typeface="+mn-lt"/>
+                <a:ea typeface="+mn-ea"/>
+                <a:cs typeface="+mn-cs"/>
+              </a:defRPr>
+            </a:lvl5pPr>
+            <a:lvl6pPr marL="2514600" indent="-228600" algn="l" defTabSz="914400" rtl="0" eaLnBrk="1" latinLnBrk="0" hangingPunct="1">
+              <a:spcBef>
+                <a:spcPct val="20000"/>
+              </a:spcBef>
+              <a:buFont typeface="Arial" panose="020B0604020202020204" pitchFamily="34" charset="0"/>
+              <a:buChar char="•"/>
+              <a:defRPr sz="2000" kern="1200">
+                <a:solidFill>
+                  <a:schemeClr val="tx1"/>
+                </a:solidFill>
+                <a:latin typeface="+mn-lt"/>
+                <a:ea typeface="+mn-ea"/>
+                <a:cs typeface="+mn-cs"/>
+              </a:defRPr>
+            </a:lvl6pPr>
+            <a:lvl7pPr marL="2971800" indent="-228600" algn="l" defTabSz="914400" rtl="0" eaLnBrk="1" latinLnBrk="0" hangingPunct="1">
+              <a:spcBef>
+                <a:spcPct val="20000"/>
+              </a:spcBef>
+              <a:buFont typeface="Arial" panose="020B0604020202020204" pitchFamily="34" charset="0"/>
+              <a:buChar char="•"/>
+              <a:defRPr sz="2000" kern="1200">
+                <a:solidFill>
+                  <a:schemeClr val="tx1"/>
+                </a:solidFill>
+                <a:latin typeface="+mn-lt"/>
+                <a:ea typeface="+mn-ea"/>
+                <a:cs typeface="+mn-cs"/>
+              </a:defRPr>
+            </a:lvl7pPr>
+            <a:lvl8pPr marL="3429000" indent="-228600" algn="l" defTabSz="914400" rtl="0" eaLnBrk="1" latinLnBrk="0" hangingPunct="1">
+              <a:spcBef>
+                <a:spcPct val="20000"/>
+              </a:spcBef>
+              <a:buFont typeface="Arial" panose="020B0604020202020204" pitchFamily="34" charset="0"/>
+              <a:buChar char="•"/>
+              <a:defRPr sz="2000" kern="1200">
+                <a:solidFill>
+                  <a:schemeClr val="tx1"/>
+                </a:solidFill>
+                <a:latin typeface="+mn-lt"/>
+                <a:ea typeface="+mn-ea"/>
+                <a:cs typeface="+mn-cs"/>
+              </a:defRPr>
+            </a:lvl8pPr>
+            <a:lvl9pPr marL="3886200" indent="-228600" algn="l" defTabSz="914400" rtl="0" eaLnBrk="1" latinLnBrk="0" hangingPunct="1">
+              <a:spcBef>
+                <a:spcPct val="20000"/>
+              </a:spcBef>
+              <a:buFont typeface="Arial" panose="020B0604020202020204" pitchFamily="34" charset="0"/>
+              <a:buChar char="•"/>
+              <a:defRPr sz="2000" kern="1200">
+                <a:solidFill>
+                  <a:schemeClr val="tx1"/>
+                </a:solidFill>
+                <a:latin typeface="+mn-lt"/>
+                <a:ea typeface="+mn-ea"/>
+                <a:cs typeface="+mn-cs"/>
+              </a:defRPr>
+            </a:lvl9pPr>
+          </a:lstStyle>
+          <a:p>
+            <a:pPr marL="0" indent="0" algn="r">
+              <a:buNone/>
+            </a:pPr>
+            <a:r>
+              <a:rPr lang="fr-FR" sz="2800" smtClean="0">
+                <a:latin typeface="Yu Gothic UI Light" panose="020B0300000000000000" pitchFamily="34" charset="-128"/>
+                <a:ea typeface="Yu Gothic UI Light" panose="020B0300000000000000" pitchFamily="34" charset="-128"/>
+                <a:cs typeface="Segoe UI" panose="020B0502040204020203" pitchFamily="34" charset="0"/>
+              </a:rPr>
+              <a:t>Problématique</a:t>
+            </a:r>
+          </a:p>
+          <a:p>
+            <a:pPr marL="0" indent="0" algn="r">
+              <a:buNone/>
+            </a:pPr>
+            <a:r>
+              <a:rPr lang="fr-FR" sz="2800" smtClean="0">
+                <a:latin typeface="Yu Gothic UI Light" panose="020B0300000000000000" pitchFamily="34" charset="-128"/>
+                <a:ea typeface="Yu Gothic UI Light" panose="020B0300000000000000" pitchFamily="34" charset="-128"/>
+                <a:cs typeface="Segoe UI" panose="020B0502040204020203" pitchFamily="34" charset="0"/>
+              </a:rPr>
+              <a:t>Données</a:t>
+            </a:r>
+          </a:p>
+          <a:p>
+            <a:pPr marL="0" indent="0" algn="r">
+              <a:buNone/>
+            </a:pPr>
+            <a:r>
+              <a:rPr lang="fr-FR" sz="2800" smtClean="0">
+                <a:latin typeface="Yu Gothic UI Light" panose="020B0300000000000000" pitchFamily="34" charset="-128"/>
+                <a:ea typeface="Yu Gothic UI Light" panose="020B0300000000000000" pitchFamily="34" charset="-128"/>
+                <a:cs typeface="Segoe UI" panose="020B0502040204020203" pitchFamily="34" charset="0"/>
+              </a:rPr>
+              <a:t>Modélisation</a:t>
+            </a:r>
+          </a:p>
+          <a:p>
+            <a:pPr marL="0" indent="0" algn="r">
+              <a:buNone/>
+            </a:pPr>
+            <a:r>
+              <a:rPr lang="fr-FR" sz="2800" smtClean="0">
+                <a:latin typeface="+mj-lt"/>
+                <a:ea typeface="Yu Gothic UI Light" panose="020B0300000000000000" pitchFamily="34" charset="-128"/>
+                <a:cs typeface="Segoe UI" panose="020B0502040204020203" pitchFamily="34" charset="0"/>
+              </a:rPr>
+              <a:t>Conclusions</a:t>
+            </a:r>
+          </a:p>
+          <a:p>
+            <a:pPr algn="r"/>
+            <a:endParaRPr lang="fr-FR" sz="2800">
+              <a:latin typeface="Yu Gothic UI Light" panose="020B0300000000000000" pitchFamily="34" charset="-128"/>
+              <a:ea typeface="Yu Gothic UI Light" panose="020B0300000000000000" pitchFamily="34" charset="-128"/>
+            </a:endParaRPr>
+          </a:p>
+        </p:txBody>
+      </p:sp>
+      <p:grpSp>
+        <p:nvGrpSpPr>
+          <p:cNvPr id="3" name="Groupe 2"/>
+          <p:cNvGrpSpPr/>
+          <p:nvPr/>
+        </p:nvGrpSpPr>
+        <p:grpSpPr>
+          <a:xfrm>
+            <a:off x="8288350" y="3135701"/>
+            <a:ext cx="244091" cy="2085529"/>
+            <a:chOff x="8288350" y="3135701"/>
+            <a:chExt cx="244091" cy="2085529"/>
+          </a:xfrm>
+        </p:grpSpPr>
+        <p:grpSp>
+          <p:nvGrpSpPr>
+            <p:cNvPr id="16" name="Groupe 15"/>
+            <p:cNvGrpSpPr/>
+            <p:nvPr/>
+          </p:nvGrpSpPr>
+          <p:grpSpPr>
+            <a:xfrm>
+              <a:off x="8288350" y="3135701"/>
+              <a:ext cx="244090" cy="2085523"/>
+              <a:chOff x="8648390" y="4292733"/>
+              <a:chExt cx="144016" cy="864096"/>
+            </a:xfrm>
+          </p:grpSpPr>
+          <p:sp>
+            <p:nvSpPr>
+              <p:cNvPr id="18" name="Rectangle 17"/>
+              <p:cNvSpPr/>
+              <p:nvPr/>
+            </p:nvSpPr>
+            <p:spPr>
+              <a:xfrm>
+                <a:off x="8648390" y="4292733"/>
+                <a:ext cx="144016" cy="216024"/>
+              </a:xfrm>
+              <a:prstGeom prst="rect">
+                <a:avLst/>
+              </a:prstGeom>
+              <a:solidFill>
+                <a:schemeClr val="bg1">
+                  <a:lumMod val="50000"/>
+                </a:schemeClr>
+              </a:solidFill>
+              <a:ln w="6350">
+                <a:solidFill>
+                  <a:schemeClr val="bg1">
+                    <a:lumMod val="65000"/>
+                  </a:schemeClr>
+                </a:solidFill>
+              </a:ln>
+            </p:spPr>
+            <p:style>
+              <a:lnRef idx="2">
+                <a:schemeClr val="accent1">
+                  <a:shade val="50000"/>
+                </a:schemeClr>
+              </a:lnRef>
+              <a:fillRef idx="1">
+                <a:schemeClr val="accent1"/>
+              </a:fillRef>
+              <a:effectRef idx="0">
+                <a:schemeClr val="accent1"/>
+              </a:effectRef>
+              <a:fontRef idx="minor">
+                <a:schemeClr val="lt1"/>
+              </a:fontRef>
+            </p:style>
+            <p:txBody>
+              <a:bodyPr rtlCol="0" anchor="ctr"/>
+              <a:lstStyle/>
+              <a:p>
+                <a:pPr algn="ctr"/>
+                <a:endParaRPr lang="fr-FR">
+                  <a:latin typeface="Yu Gothic UI Light" panose="020B0300000000000000" pitchFamily="34" charset="-128"/>
+                  <a:ea typeface="Yu Gothic UI Light" panose="020B0300000000000000" pitchFamily="34" charset="-128"/>
+                </a:endParaRPr>
+              </a:p>
+            </p:txBody>
+          </p:sp>
+          <p:sp>
+            <p:nvSpPr>
+              <p:cNvPr id="20" name="Rectangle 19"/>
+              <p:cNvSpPr/>
+              <p:nvPr/>
+            </p:nvSpPr>
+            <p:spPr>
+              <a:xfrm>
+                <a:off x="8648390" y="4508757"/>
+                <a:ext cx="144016" cy="216024"/>
+              </a:xfrm>
+              <a:prstGeom prst="rect">
+                <a:avLst/>
+              </a:prstGeom>
+              <a:solidFill>
+                <a:schemeClr val="bg1">
+                  <a:lumMod val="50000"/>
+                </a:schemeClr>
+              </a:solidFill>
+              <a:ln w="6350">
+                <a:solidFill>
+                  <a:schemeClr val="bg1">
+                    <a:lumMod val="65000"/>
+                  </a:schemeClr>
+                </a:solidFill>
+              </a:ln>
+            </p:spPr>
+            <p:style>
+              <a:lnRef idx="2">
+                <a:schemeClr val="accent1">
+                  <a:shade val="50000"/>
+                </a:schemeClr>
+              </a:lnRef>
+              <a:fillRef idx="1">
+                <a:schemeClr val="accent1"/>
+              </a:fillRef>
+              <a:effectRef idx="0">
+                <a:schemeClr val="accent1"/>
+              </a:effectRef>
+              <a:fontRef idx="minor">
+                <a:schemeClr val="lt1"/>
+              </a:fontRef>
+            </p:style>
+            <p:txBody>
+              <a:bodyPr rtlCol="0" anchor="ctr"/>
+              <a:lstStyle/>
+              <a:p>
+                <a:pPr algn="ctr"/>
+                <a:endParaRPr lang="fr-FR">
+                  <a:latin typeface="Yu Gothic UI Light" panose="020B0300000000000000" pitchFamily="34" charset="-128"/>
+                  <a:ea typeface="Yu Gothic UI Light" panose="020B0300000000000000" pitchFamily="34" charset="-128"/>
+                </a:endParaRPr>
+              </a:p>
+            </p:txBody>
+          </p:sp>
+          <p:sp>
+            <p:nvSpPr>
+              <p:cNvPr id="21" name="Rectangle 20"/>
+              <p:cNvSpPr/>
+              <p:nvPr/>
+            </p:nvSpPr>
+            <p:spPr>
+              <a:xfrm>
+                <a:off x="8648390" y="4724781"/>
+                <a:ext cx="144016" cy="216024"/>
+              </a:xfrm>
+              <a:prstGeom prst="rect">
+                <a:avLst/>
+              </a:prstGeom>
+              <a:solidFill>
+                <a:schemeClr val="bg1">
+                  <a:lumMod val="50000"/>
+                </a:schemeClr>
+              </a:solidFill>
+              <a:ln w="6350">
+                <a:solidFill>
+                  <a:schemeClr val="bg1">
+                    <a:lumMod val="65000"/>
+                  </a:schemeClr>
+                </a:solidFill>
+              </a:ln>
+            </p:spPr>
+            <p:style>
+              <a:lnRef idx="2">
+                <a:schemeClr val="accent1">
+                  <a:shade val="50000"/>
+                </a:schemeClr>
+              </a:lnRef>
+              <a:fillRef idx="1">
+                <a:schemeClr val="accent1"/>
+              </a:fillRef>
+              <a:effectRef idx="0">
+                <a:schemeClr val="accent1"/>
+              </a:effectRef>
+              <a:fontRef idx="minor">
+                <a:schemeClr val="lt1"/>
+              </a:fontRef>
+            </p:style>
+            <p:txBody>
+              <a:bodyPr rtlCol="0" anchor="ctr"/>
+              <a:lstStyle/>
+              <a:p>
+                <a:pPr algn="ctr"/>
+                <a:endParaRPr lang="fr-FR">
+                  <a:latin typeface="Yu Gothic UI Light" panose="020B0300000000000000" pitchFamily="34" charset="-128"/>
+                  <a:ea typeface="Yu Gothic UI Light" panose="020B0300000000000000" pitchFamily="34" charset="-128"/>
+                </a:endParaRPr>
+              </a:p>
+            </p:txBody>
+          </p:sp>
+          <p:sp>
+            <p:nvSpPr>
+              <p:cNvPr id="22" name="Rectangle 21"/>
+              <p:cNvSpPr/>
+              <p:nvPr/>
+            </p:nvSpPr>
+            <p:spPr>
+              <a:xfrm>
+                <a:off x="8648390" y="4940805"/>
+                <a:ext cx="144016" cy="216024"/>
+              </a:xfrm>
+              <a:prstGeom prst="rect">
+                <a:avLst/>
+              </a:prstGeom>
+              <a:solidFill>
+                <a:schemeClr val="bg1">
+                  <a:lumMod val="50000"/>
+                </a:schemeClr>
+              </a:solidFill>
+              <a:ln w="6350">
+                <a:solidFill>
+                  <a:schemeClr val="bg1">
+                    <a:lumMod val="65000"/>
+                  </a:schemeClr>
+                </a:solidFill>
+              </a:ln>
+            </p:spPr>
+            <p:style>
+              <a:lnRef idx="2">
+                <a:schemeClr val="accent1">
+                  <a:shade val="50000"/>
+                </a:schemeClr>
+              </a:lnRef>
+              <a:fillRef idx="1">
+                <a:schemeClr val="accent1"/>
+              </a:fillRef>
+              <a:effectRef idx="0">
+                <a:schemeClr val="accent1"/>
+              </a:effectRef>
+              <a:fontRef idx="minor">
+                <a:schemeClr val="lt1"/>
+              </a:fontRef>
+            </p:style>
+            <p:txBody>
+              <a:bodyPr rtlCol="0" anchor="ctr"/>
+              <a:lstStyle/>
+              <a:p>
+                <a:pPr algn="ctr"/>
+                <a:endParaRPr lang="fr-FR">
+                  <a:latin typeface="Yu Gothic UI Light" panose="020B0300000000000000" pitchFamily="34" charset="-128"/>
+                  <a:ea typeface="Yu Gothic UI Light" panose="020B0300000000000000" pitchFamily="34" charset="-128"/>
+                </a:endParaRPr>
+              </a:p>
+            </p:txBody>
+          </p:sp>
+        </p:grpSp>
+        <p:sp>
+          <p:nvSpPr>
+            <p:cNvPr id="27" name="Rectangle 26"/>
+            <p:cNvSpPr/>
+            <p:nvPr/>
+          </p:nvSpPr>
+          <p:spPr>
+            <a:xfrm>
+              <a:off x="8288351" y="4699849"/>
+              <a:ext cx="244090" cy="521381"/>
+            </a:xfrm>
+            <a:prstGeom prst="rect">
+              <a:avLst/>
+            </a:prstGeom>
+            <a:solidFill>
+              <a:srgbClr val="0000FA"/>
+            </a:solidFill>
+            <a:ln w="6350">
+              <a:solidFill>
+                <a:schemeClr val="bg1">
+                  <a:lumMod val="65000"/>
+                </a:schemeClr>
+              </a:solidFill>
+            </a:ln>
+          </p:spPr>
+          <p:style>
+            <a:lnRef idx="2">
+              <a:schemeClr val="accent1">
+                <a:shade val="50000"/>
+              </a:schemeClr>
+            </a:lnRef>
+            <a:fillRef idx="1">
+              <a:schemeClr val="accent1"/>
+            </a:fillRef>
+            <a:effectRef idx="0">
+              <a:schemeClr val="accent1"/>
+            </a:effectRef>
+            <a:fontRef idx="minor">
+              <a:schemeClr val="lt1"/>
+            </a:fontRef>
+          </p:style>
+          <p:txBody>
+            <a:bodyPr rtlCol="0" anchor="ctr"/>
+            <a:lstStyle/>
+            <a:p>
+              <a:pPr algn="ctr"/>
+              <a:endParaRPr lang="fr-FR"/>
+            </a:p>
+          </p:txBody>
+        </p:sp>
+      </p:grpSp>
+    </p:spTree>
+    <p:extLst>
+      <p:ext uri="{BB962C8B-B14F-4D97-AF65-F5344CB8AC3E}">
+        <p14:creationId xmlns:p14="http://schemas.microsoft.com/office/powerpoint/2010/main" val="3108534008"/>
+      </p:ext>
+    </p:extLst>
+  </p:cSld>
+  <p:clrMapOvr>
+    <a:masterClrMapping/>
+  </p:clrMapOvr>
+  <p:timing>
+    <p:tnLst>
+      <p:par>
+        <p:cTn id="1" dur="indefinite" restart="never" nodeType="tmRoot"/>
+      </p:par>
+    </p:tnLst>
+  </p:timing>
+</p:sld>
+</file>
+
+<file path=ppt/slides/slide7.xml><?xml version="1.0" encoding="utf-8"?>
+<p:sld xmlns:a="http://schemas.openxmlformats.org/drawingml/2006/main" xmlns:r="http://schemas.openxmlformats.org/officeDocument/2006/relationships" xmlns:p="http://schemas.openxmlformats.org/presentationml/2006/main">
+  <p:cSld>
+    <p:spTree>
+      <p:nvGrpSpPr>
+        <p:cNvPr id="1" name=""/>
+        <p:cNvGrpSpPr/>
+        <p:nvPr/>
+      </p:nvGrpSpPr>
+      <p:grpSpPr>
+        <a:xfrm>
+          <a:off x="0" y="0"/>
+          <a:ext cx="0" cy="0"/>
+          <a:chOff x="0" y="0"/>
+          <a:chExt cx="0" cy="0"/>
+        </a:xfrm>
+      </p:grpSpPr>
+      <p:sp>
+        <p:nvSpPr>
           <p:cNvPr id="2" name="Titre 1"/>
           <p:cNvSpPr>
             <a:spLocks noGrp="1"/>
@@ -6185,7 +7450,7 @@
           <a:p>
             <a:fld id="{D384C430-F8FC-4B07-B0BC-750FA1B3CF0A}" type="slidenum">
               <a:rPr lang="fr-FR" smtClean="0"/>
-              <a:t>5</a:t>
+              <a:t>7</a:t>
             </a:fld>
             <a:endParaRPr lang="fr-FR"/>
           </a:p>
@@ -7518,7 +8783,7 @@
 </p:sld>
 </file>
 
-<file path=ppt/slides/slide6.xml><?xml version="1.0" encoding="utf-8"?>
+<file path=ppt/slides/slide8.xml><?xml version="1.0" encoding="utf-8"?>
 <p:sld xmlns:a="http://schemas.openxmlformats.org/drawingml/2006/main" xmlns:r="http://schemas.openxmlformats.org/officeDocument/2006/relationships" xmlns:p="http://schemas.openxmlformats.org/presentationml/2006/main">
   <p:cSld>
     <p:spTree>
@@ -7631,7 +8896,7 @@
           <a:p>
             <a:fld id="{D384C430-F8FC-4B07-B0BC-750FA1B3CF0A}" type="slidenum">
               <a:rPr lang="fr-FR" smtClean="0"/>
-              <a:t>6</a:t>
+              <a:t>8</a:t>
             </a:fld>
             <a:endParaRPr lang="fr-FR"/>
           </a:p>

</xml_diff>